<commit_message>
modelo relacional arreglado - presentacion
</commit_message>
<xml_diff>
--- a/Lawbrary2.pptx
+++ b/Lawbrary2.pptx
@@ -1271,7 +1271,7 @@
           <a:p>
             <a:fld id="{8ECBA82C-2888-4D3C-8C75-64D9616B7D51}" type="datetimeFigureOut">
               <a:rPr lang="es-GT" smtClean="0"/>
-              <a:t>25/11/2019</a:t>
+              <a:t>28/11/2019</a:t>
             </a:fld>
             <a:endParaRPr lang="es-GT"/>
           </a:p>
@@ -1441,7 +1441,7 @@
           <a:p>
             <a:fld id="{8ECBA82C-2888-4D3C-8C75-64D9616B7D51}" type="datetimeFigureOut">
               <a:rPr lang="es-GT" smtClean="0"/>
-              <a:t>25/11/2019</a:t>
+              <a:t>28/11/2019</a:t>
             </a:fld>
             <a:endParaRPr lang="es-GT"/>
           </a:p>
@@ -1621,7 +1621,7 @@
           <a:p>
             <a:fld id="{8ECBA82C-2888-4D3C-8C75-64D9616B7D51}" type="datetimeFigureOut">
               <a:rPr lang="es-GT" smtClean="0"/>
-              <a:t>25/11/2019</a:t>
+              <a:t>28/11/2019</a:t>
             </a:fld>
             <a:endParaRPr lang="es-GT"/>
           </a:p>
@@ -2000,7 +2000,7 @@
           <a:p>
             <a:fld id="{8ECBA82C-2888-4D3C-8C75-64D9616B7D51}" type="datetimeFigureOut">
               <a:rPr lang="es-GT" smtClean="0"/>
-              <a:t>25/11/2019</a:t>
+              <a:t>28/11/2019</a:t>
             </a:fld>
             <a:endParaRPr lang="es-GT"/>
           </a:p>
@@ -2188,7 +2188,7 @@
           <a:p>
             <a:fld id="{8ECBA82C-2888-4D3C-8C75-64D9616B7D51}" type="datetimeFigureOut">
               <a:rPr lang="es-GT" smtClean="0"/>
-              <a:t>25/11/2019</a:t>
+              <a:t>28/11/2019</a:t>
             </a:fld>
             <a:endParaRPr lang="es-GT"/>
           </a:p>
@@ -2455,7 +2455,7 @@
           <a:p>
             <a:fld id="{8ECBA82C-2888-4D3C-8C75-64D9616B7D51}" type="datetimeFigureOut">
               <a:rPr lang="es-GT" smtClean="0"/>
-              <a:t>25/11/2019</a:t>
+              <a:t>28/11/2019</a:t>
             </a:fld>
             <a:endParaRPr lang="es-GT"/>
           </a:p>
@@ -2808,7 +2808,7 @@
           <a:p>
             <a:fld id="{8ECBA82C-2888-4D3C-8C75-64D9616B7D51}" type="datetimeFigureOut">
               <a:rPr lang="es-GT" smtClean="0"/>
-              <a:t>25/11/2019</a:t>
+              <a:t>28/11/2019</a:t>
             </a:fld>
             <a:endParaRPr lang="es-GT"/>
           </a:p>
@@ -3121,7 +3121,7 @@
           <a:p>
             <a:fld id="{8ECBA82C-2888-4D3C-8C75-64D9616B7D51}" type="datetimeFigureOut">
               <a:rPr lang="es-GT" smtClean="0"/>
-              <a:t>25/11/2019</a:t>
+              <a:t>28/11/2019</a:t>
             </a:fld>
             <a:endParaRPr lang="es-GT"/>
           </a:p>
@@ -3353,7 +3353,7 @@
           <a:p>
             <a:fld id="{8ECBA82C-2888-4D3C-8C75-64D9616B7D51}" type="datetimeFigureOut">
               <a:rPr lang="es-GT" smtClean="0"/>
-              <a:t>25/11/2019</a:t>
+              <a:t>28/11/2019</a:t>
             </a:fld>
             <a:endParaRPr lang="es-GT"/>
           </a:p>
@@ -3448,7 +3448,7 @@
           <a:p>
             <a:fld id="{8ECBA82C-2888-4D3C-8C75-64D9616B7D51}" type="datetimeFigureOut">
               <a:rPr lang="es-GT" smtClean="0"/>
-              <a:t>25/11/2019</a:t>
+              <a:t>28/11/2019</a:t>
             </a:fld>
             <a:endParaRPr lang="es-GT"/>
           </a:p>
@@ -3741,7 +3741,7 @@
           <a:p>
             <a:fld id="{8ECBA82C-2888-4D3C-8C75-64D9616B7D51}" type="datetimeFigureOut">
               <a:rPr lang="es-GT" smtClean="0"/>
-              <a:t>25/11/2019</a:t>
+              <a:t>28/11/2019</a:t>
             </a:fld>
             <a:endParaRPr lang="es-GT"/>
           </a:p>
@@ -4015,7 +4015,7 @@
           <a:p>
             <a:fld id="{8ECBA82C-2888-4D3C-8C75-64D9616B7D51}" type="datetimeFigureOut">
               <a:rPr lang="es-GT" smtClean="0"/>
-              <a:t>25/11/2019</a:t>
+              <a:t>28/11/2019</a:t>
             </a:fld>
             <a:endParaRPr lang="es-GT"/>
           </a:p>
@@ -4230,7 +4230,7 @@
           <a:p>
             <a:fld id="{8ECBA82C-2888-4D3C-8C75-64D9616B7D51}" type="datetimeFigureOut">
               <a:rPr lang="es-GT" smtClean="0"/>
-              <a:t>25/11/2019</a:t>
+              <a:t>28/11/2019</a:t>
             </a:fld>
             <a:endParaRPr lang="es-GT"/>
           </a:p>
@@ -7199,7 +7199,12 @@
             <p:ph type="title"/>
           </p:nvPr>
         </p:nvSpPr>
-        <p:spPr/>
+        <p:spPr>
+          <a:xfrm>
+            <a:off x="8548172" y="2628900"/>
+            <a:ext cx="3643828" cy="1600200"/>
+          </a:xfrm>
+        </p:spPr>
         <p:txBody>
           <a:bodyPr/>
           <a:lstStyle/>
@@ -7252,10 +7257,10 @@
       </p:sp>
       <p:pic>
         <p:nvPicPr>
-          <p:cNvPr id="3074" name="Picture 2">
+          <p:cNvPr id="1026" name="Picture 2">
             <a:extLst>
               <a:ext uri="{FF2B5EF4-FFF2-40B4-BE49-F238E27FC236}">
-                <a16:creationId xmlns:a16="http://schemas.microsoft.com/office/drawing/2014/main" id="{28967CBA-E0A3-4BEE-A02A-E0A3A70C2CC7}"/>
+                <a16:creationId xmlns:a16="http://schemas.microsoft.com/office/drawing/2014/main" id="{DD64E9D2-9B9B-40D7-B3DF-0402A8A95240}"/>
               </a:ext>
             </a:extLst>
           </p:cNvPr>
@@ -7279,8 +7284,8 @@
         </p:blipFill>
         <p:spPr bwMode="auto">
           <a:xfrm>
-            <a:off x="686802" y="1469976"/>
-            <a:ext cx="9158834" cy="5208255"/>
+            <a:off x="0" y="0"/>
+            <a:ext cx="8431213" cy="6858000"/>
           </a:xfrm>
           <a:prstGeom prst="rect">
             <a:avLst/>

</xml_diff>